<commit_message>
Added data definitions and minor edits
</commit_message>
<xml_diff>
--- a/CapstoneProjectProposal.pptx
+++ b/CapstoneProjectProposal.pptx
@@ -7,6 +7,7 @@
   <p:sldIdLst>
     <p:sldId id="256" r:id="rId2"/>
     <p:sldId id="257" r:id="rId3"/>
+    <p:sldId id="258" r:id="rId4"/>
   </p:sldIdLst>
   <p:sldSz cx="9144000" cy="6858000" type="screen4x3"/>
   <p:notesSz cx="6858000" cy="9144000"/>
@@ -296,7 +297,7 @@
           <a:p>
             <a:fld id="{C8A432C8-69A7-458B-9684-2BFA64B31948}" type="datetime2">
               <a:rPr lang="en-US" smtClean="0"/>
-              <a:t>Tuesday, February 21, 17</a:t>
+              <a:t>Saturday, February 25, 17</a:t>
             </a:fld>
             <a:endParaRPr lang="en-US"/>
           </a:p>
@@ -498,7 +499,7 @@
           <a:p>
             <a:fld id="{8CC057FC-95B6-4D89-AFDA-ABA33EE921E5}" type="datetime2">
               <a:rPr lang="en-US" smtClean="0"/>
-              <a:t>Tuesday, February 21, 17</a:t>
+              <a:t>Saturday, February 25, 17</a:t>
             </a:fld>
             <a:endParaRPr lang="en-US"/>
           </a:p>
@@ -675,7 +676,7 @@
           <a:p>
             <a:fld id="{EC4549AC-EB31-477F-92A9-B1988E232878}" type="datetime2">
               <a:rPr lang="en-US" smtClean="0"/>
-              <a:t>Tuesday, February 21, 17</a:t>
+              <a:t>Saturday, February 25, 17</a:t>
             </a:fld>
             <a:endParaRPr lang="en-US"/>
           </a:p>
@@ -842,7 +843,7 @@
           <a:p>
             <a:fld id="{6396A3A3-94A6-4E5B-AF39-173ACA3E61CC}" type="datetime2">
               <a:rPr lang="en-US" smtClean="0"/>
-              <a:t>Tuesday, February 21, 17</a:t>
+              <a:t>Saturday, February 25, 17</a:t>
             </a:fld>
             <a:endParaRPr lang="en-US"/>
           </a:p>
@@ -1092,7 +1093,7 @@
           <a:p>
             <a:fld id="{9933D019-A32C-4EAD-B8E6-DBDA699692FD}" type="datetime2">
               <a:rPr lang="en-US" smtClean="0"/>
-              <a:t>Tuesday, February 21, 17</a:t>
+              <a:t>Saturday, February 25, 17</a:t>
             </a:fld>
             <a:endParaRPr lang="en-US"/>
           </a:p>
@@ -1412,7 +1413,7 @@
           <a:p>
             <a:fld id="{CCEBA98F-560C-4997-81C4-81D4D9187EAB}" type="datetime2">
               <a:rPr lang="en-US" smtClean="0"/>
-              <a:t>Tuesday, February 21, 17</a:t>
+              <a:t>Saturday, February 25, 17</a:t>
             </a:fld>
             <a:endParaRPr lang="en-US"/>
           </a:p>
@@ -1880,7 +1881,7 @@
           <a:p>
             <a:fld id="{150972B2-CA5C-437D-87D0-8081271A9E4B}" type="datetime2">
               <a:rPr lang="en-US" smtClean="0"/>
-              <a:t>Tuesday, February 21, 17</a:t>
+              <a:t>Saturday, February 25, 17</a:t>
             </a:fld>
             <a:endParaRPr lang="en-US"/>
           </a:p>
@@ -2030,7 +2031,7 @@
           <a:p>
             <a:fld id="{79CD4847-11EF-4466-A8AD-85CDB7B49118}" type="datetime2">
               <a:rPr lang="en-US" smtClean="0"/>
-              <a:t>Tuesday, February 21, 17</a:t>
+              <a:t>Saturday, February 25, 17</a:t>
             </a:fld>
             <a:endParaRPr lang="en-US"/>
           </a:p>
@@ -2122,7 +2123,7 @@
           <a:p>
             <a:fld id="{F168457A-3AB9-4880-8A0C-9F8524491207}" type="datetime2">
               <a:rPr lang="en-US" smtClean="0"/>
-              <a:t>Tuesday, February 21, 17</a:t>
+              <a:t>Saturday, February 25, 17</a:t>
             </a:fld>
             <a:endParaRPr lang="en-US"/>
           </a:p>
@@ -2398,7 +2399,7 @@
           <a:p>
             <a:fld id="{3FE976D3-5B7F-4300-ABED-C91F1B2AE209}" type="datetime2">
               <a:rPr lang="en-US" smtClean="0"/>
-              <a:t>Tuesday, February 21, 17</a:t>
+              <a:t>Saturday, February 25, 17</a:t>
             </a:fld>
             <a:endParaRPr lang="en-US"/>
           </a:p>
@@ -2705,7 +2706,7 @@
           <a:p>
             <a:fld id="{EBDC1E59-17DD-41CE-97CA-624A472382D4}" type="datetime2">
               <a:rPr lang="en-US" smtClean="0"/>
-              <a:t>Tuesday, February 21, 17</a:t>
+              <a:t>Saturday, February 25, 17</a:t>
             </a:fld>
             <a:endParaRPr lang="en-US"/>
           </a:p>
@@ -3005,7 +3006,7 @@
           <a:p>
             <a:fld id="{A80CB818-7379-467D-8E76-EF9D9074A26C}" type="datetime2">
               <a:rPr lang="en-US" smtClean="0"/>
-              <a:t>Tuesday, February 21, 17</a:t>
+              <a:t>Saturday, February 25, 17</a:t>
             </a:fld>
             <a:endParaRPr lang="en-US" dirty="0"/>
           </a:p>
@@ -3441,18 +3442,9 @@
         <p:spPr/>
         <p:txBody>
           <a:bodyPr>
-            <a:normAutofit fontScale="77500" lnSpcReduction="20000"/>
+            <a:normAutofit/>
           </a:bodyPr>
           <a:lstStyle/>
-          <a:p>
-            <a:r>
-              <a:rPr lang="en-US" dirty="0" smtClean="0"/>
-              <a:t>Project Proposal</a:t>
-            </a:r>
-          </a:p>
-          <a:p>
-            <a:endParaRPr lang="en-US" dirty="0"/>
-          </a:p>
           <a:p>
             <a:r>
               <a:rPr lang="en-US" dirty="0" smtClean="0"/>
@@ -3622,8 +3614,13 @@
             </a:r>
             <a:r>
               <a:rPr lang="en-US" sz="1400" dirty="0" smtClean="0"/>
-              <a:t>Improve visibility of login patterns and issues to refine adoption projections and feature enhancement prioritization.</a:t>
-            </a:r>
+              <a:t>Improve visibility of login patterns and issues to refine adoption projections and </a:t>
+            </a:r>
+            <a:r>
+              <a:rPr lang="en-US" sz="1400" dirty="0" smtClean="0"/>
+              <a:t>drive prioritization of enhancements and fixes.</a:t>
+            </a:r>
+            <a:endParaRPr lang="en-US" sz="1400" dirty="0" smtClean="0"/>
           </a:p>
           <a:p>
             <a:pPr marL="731520" lvl="1" indent="-457200">
@@ -3685,7 +3682,15 @@
             </a:pPr>
             <a:r>
               <a:rPr lang="en-US" sz="1400" dirty="0" smtClean="0"/>
-              <a:t>Data will be extracted from the source, cleaned and transformed as needed, analyzed and summarized.</a:t>
+              <a:t>Data will be extracted from the source, cleaned and </a:t>
+            </a:r>
+            <a:r>
+              <a:rPr lang="en-US" sz="1400" dirty="0" smtClean="0"/>
+              <a:t>transformed, </a:t>
+            </a:r>
+            <a:r>
+              <a:rPr lang="en-US" sz="1400" dirty="0" smtClean="0"/>
+              <a:t>analyzed and summarized.</a:t>
             </a:r>
             <a:endParaRPr lang="en-US" sz="1400" dirty="0"/>
           </a:p>
@@ -3704,7 +3709,15 @@
             </a:pPr>
             <a:r>
               <a:rPr lang="en-US" sz="1400" dirty="0" smtClean="0"/>
-              <a:t>Slide Deck, R Code, Visualizations</a:t>
+              <a:t>README, Slide </a:t>
+            </a:r>
+            <a:r>
+              <a:rPr lang="en-US" sz="1400" dirty="0" smtClean="0"/>
+              <a:t>Deck, R Code</a:t>
+            </a:r>
+            <a:r>
+              <a:rPr lang="en-US" sz="1400" dirty="0" smtClean="0"/>
+              <a:t>, and Report</a:t>
             </a:r>
             <a:endParaRPr lang="en-US" sz="1400" dirty="0"/>
           </a:p>
@@ -3714,6 +3727,725 @@
     <p:extLst>
       <p:ext uri="{BB962C8B-B14F-4D97-AF65-F5344CB8AC3E}">
         <p14:creationId xmlns:p14="http://schemas.microsoft.com/office/powerpoint/2010/main" val="1141924497"/>
+      </p:ext>
+    </p:extLst>
+  </p:cSld>
+  <p:clrMapOvr>
+    <a:masterClrMapping/>
+  </p:clrMapOvr>
+</p:sld>
+</file>
+
+<file path=ppt/slides/slide3.xml><?xml version="1.0" encoding="utf-8"?>
+<p:sld xmlns:a="http://schemas.openxmlformats.org/drawingml/2006/main" xmlns:r="http://schemas.openxmlformats.org/officeDocument/2006/relationships" xmlns:p="http://schemas.openxmlformats.org/presentationml/2006/main">
+  <p:cSld>
+    <p:spTree>
+      <p:nvGrpSpPr>
+        <p:cNvPr id="1" name=""/>
+        <p:cNvGrpSpPr/>
+        <p:nvPr/>
+      </p:nvGrpSpPr>
+      <p:grpSpPr>
+        <a:xfrm>
+          <a:off x="0" y="0"/>
+          <a:ext cx="0" cy="0"/>
+          <a:chOff x="0" y="0"/>
+          <a:chExt cx="0" cy="0"/>
+        </a:xfrm>
+      </p:grpSpPr>
+      <p:sp>
+        <p:nvSpPr>
+          <p:cNvPr id="2" name="Title 1"/>
+          <p:cNvSpPr>
+            <a:spLocks noGrp="1"/>
+          </p:cNvSpPr>
+          <p:nvPr>
+            <p:ph type="title"/>
+          </p:nvPr>
+        </p:nvSpPr>
+        <p:spPr/>
+        <p:txBody>
+          <a:bodyPr/>
+          <a:lstStyle/>
+          <a:p>
+            <a:r>
+              <a:rPr lang="en-US" dirty="0" smtClean="0"/>
+              <a:t>Data Dictionary</a:t>
+            </a:r>
+            <a:endParaRPr lang="en-US" dirty="0"/>
+          </a:p>
+        </p:txBody>
+      </p:sp>
+      <p:graphicFrame>
+        <p:nvGraphicFramePr>
+          <p:cNvPr id="4" name="Content Placeholder 3"/>
+          <p:cNvGraphicFramePr>
+            <a:graphicFrameLocks noGrp="1"/>
+          </p:cNvGraphicFramePr>
+          <p:nvPr>
+            <p:ph idx="1"/>
+            <p:extLst>
+              <p:ext uri="{D42A27DB-BD31-4B8C-83A1-F6EECF244321}">
+                <p14:modId xmlns:p14="http://schemas.microsoft.com/office/powerpoint/2010/main" val="3723497310"/>
+              </p:ext>
+            </p:extLst>
+          </p:nvPr>
+        </p:nvGraphicFramePr>
+        <p:xfrm>
+          <a:off x="457200" y="1600200"/>
+          <a:ext cx="8229600" cy="4663440"/>
+        </p:xfrm>
+        <a:graphic>
+          <a:graphicData uri="http://schemas.openxmlformats.org/drawingml/2006/table">
+            <a:tbl>
+              <a:tblPr firstRow="1" bandRow="1">
+                <a:tableStyleId>{3C2FFA5D-87B4-456A-9821-1D502468CF0F}</a:tableStyleId>
+              </a:tblPr>
+              <a:tblGrid>
+                <a:gridCol w="2743200"/>
+                <a:gridCol w="2743200"/>
+                <a:gridCol w="2743200"/>
+              </a:tblGrid>
+              <a:tr h="370840">
+                <a:tc>
+                  <a:txBody>
+                    <a:bodyPr/>
+                    <a:lstStyle/>
+                    <a:p>
+                      <a:r>
+                        <a:rPr lang="en-US" dirty="0" smtClean="0"/>
+                        <a:t>Field Name</a:t>
+                      </a:r>
+                      <a:endParaRPr lang="en-US" dirty="0"/>
+                    </a:p>
+                  </a:txBody>
+                  <a:tcPr/>
+                </a:tc>
+                <a:tc>
+                  <a:txBody>
+                    <a:bodyPr/>
+                    <a:lstStyle/>
+                    <a:p>
+                      <a:r>
+                        <a:rPr lang="en-US" dirty="0" smtClean="0"/>
+                        <a:t>Sample Values</a:t>
+                      </a:r>
+                      <a:endParaRPr lang="en-US" dirty="0"/>
+                    </a:p>
+                  </a:txBody>
+                  <a:tcPr/>
+                </a:tc>
+                <a:tc>
+                  <a:txBody>
+                    <a:bodyPr/>
+                    <a:lstStyle/>
+                    <a:p>
+                      <a:r>
+                        <a:rPr lang="en-US" dirty="0" smtClean="0"/>
+                        <a:t>Definition</a:t>
+                      </a:r>
+                      <a:endParaRPr lang="en-US" dirty="0"/>
+                    </a:p>
+                  </a:txBody>
+                  <a:tcPr/>
+                </a:tc>
+              </a:tr>
+              <a:tr h="370840">
+                <a:tc>
+                  <a:txBody>
+                    <a:bodyPr/>
+                    <a:lstStyle/>
+                    <a:p>
+                      <a:r>
+                        <a:rPr lang="en-US" sz="1300" dirty="0" smtClean="0"/>
+                        <a:t>APP_VERSION</a:t>
+                      </a:r>
+                      <a:endParaRPr lang="en-US" sz="1300" dirty="0"/>
+                    </a:p>
+                  </a:txBody>
+                  <a:tcPr/>
+                </a:tc>
+                <a:tc>
+                  <a:txBody>
+                    <a:bodyPr/>
+                    <a:lstStyle/>
+                    <a:p>
+                      <a:r>
+                        <a:rPr lang="pl-PL" sz="1300" kern="1200" dirty="0" smtClean="0">
+                          <a:solidFill>
+                            <a:schemeClr val="dk1"/>
+                          </a:solidFill>
+                          <a:latin typeface="+mn-lt"/>
+                          <a:ea typeface="+mn-ea"/>
+                          <a:cs typeface="+mn-cs"/>
+                        </a:rPr>
+                        <a:t>5.16.0, 5.15.0, 1613150500,  1613120600</a:t>
+                      </a:r>
+                      <a:endParaRPr lang="en-US" sz="1300" dirty="0"/>
+                    </a:p>
+                  </a:txBody>
+                  <a:tcPr/>
+                </a:tc>
+                <a:tc>
+                  <a:txBody>
+                    <a:bodyPr/>
+                    <a:lstStyle/>
+                    <a:p>
+                      <a:r>
+                        <a:rPr lang="en-US" sz="1300" kern="1200" dirty="0" smtClean="0">
+                          <a:solidFill>
+                            <a:schemeClr val="dk1"/>
+                          </a:solidFill>
+                          <a:latin typeface="+mn-lt"/>
+                          <a:ea typeface="+mn-ea"/>
+                          <a:cs typeface="+mn-cs"/>
+                        </a:rPr>
+                        <a:t>Code version for the installed mobile application</a:t>
+                      </a:r>
+                      <a:endParaRPr lang="en-US" sz="1300" dirty="0"/>
+                    </a:p>
+                  </a:txBody>
+                  <a:tcPr/>
+                </a:tc>
+              </a:tr>
+              <a:tr h="370840">
+                <a:tc>
+                  <a:txBody>
+                    <a:bodyPr/>
+                    <a:lstStyle/>
+                    <a:p>
+                      <a:r>
+                        <a:rPr lang="en-US" sz="1300" kern="1200" dirty="0" smtClean="0">
+                          <a:solidFill>
+                            <a:schemeClr val="dk1"/>
+                          </a:solidFill>
+                          <a:latin typeface="+mn-lt"/>
+                          <a:ea typeface="+mn-ea"/>
+                          <a:cs typeface="+mn-cs"/>
+                        </a:rPr>
+                        <a:t>AUTH_METHOD</a:t>
+                      </a:r>
+                      <a:endParaRPr lang="en-US" sz="1300" dirty="0"/>
+                    </a:p>
+                  </a:txBody>
+                  <a:tcPr/>
+                </a:tc>
+                <a:tc>
+                  <a:txBody>
+                    <a:bodyPr/>
+                    <a:lstStyle/>
+                    <a:p>
+                      <a:r>
+                        <a:rPr lang="en-US" sz="1300" kern="1200" dirty="0" smtClean="0">
+                          <a:solidFill>
+                            <a:schemeClr val="dk1"/>
+                          </a:solidFill>
+                          <a:latin typeface="+mn-lt"/>
+                          <a:ea typeface="+mn-ea"/>
+                          <a:cs typeface="+mn-cs"/>
+                        </a:rPr>
+                        <a:t>Password, Touch, Swipe</a:t>
+                      </a:r>
+                      <a:endParaRPr lang="en-US" sz="1300" dirty="0"/>
+                    </a:p>
+                  </a:txBody>
+                  <a:tcPr/>
+                </a:tc>
+                <a:tc>
+                  <a:txBody>
+                    <a:bodyPr/>
+                    <a:lstStyle/>
+                    <a:p>
+                      <a:r>
+                        <a:rPr lang="en-US" sz="1300" kern="1200" dirty="0" smtClean="0">
+                          <a:solidFill>
+                            <a:schemeClr val="dk1"/>
+                          </a:solidFill>
+                          <a:latin typeface="+mn-lt"/>
+                          <a:ea typeface="+mn-ea"/>
+                          <a:cs typeface="+mn-cs"/>
+                        </a:rPr>
+                        <a:t>Login method used by the user to authenticate</a:t>
+                      </a:r>
+                      <a:endParaRPr lang="en-US" sz="1300" dirty="0"/>
+                    </a:p>
+                  </a:txBody>
+                  <a:tcPr/>
+                </a:tc>
+              </a:tr>
+              <a:tr h="370840">
+                <a:tc>
+                  <a:txBody>
+                    <a:bodyPr/>
+                    <a:lstStyle/>
+                    <a:p>
+                      <a:r>
+                        <a:rPr lang="en-US" sz="1300" kern="1200" dirty="0" smtClean="0">
+                          <a:solidFill>
+                            <a:schemeClr val="dk1"/>
+                          </a:solidFill>
+                          <a:latin typeface="+mn-lt"/>
+                          <a:ea typeface="+mn-ea"/>
+                          <a:cs typeface="+mn-cs"/>
+                        </a:rPr>
+                        <a:t>CHANNEL__TYPE</a:t>
+                      </a:r>
+                      <a:endParaRPr lang="en-US" sz="1300" dirty="0"/>
+                    </a:p>
+                  </a:txBody>
+                  <a:tcPr/>
+                </a:tc>
+                <a:tc>
+                  <a:txBody>
+                    <a:bodyPr/>
+                    <a:lstStyle/>
+                    <a:p>
+                      <a:r>
+                        <a:rPr lang="en-US" sz="1300" kern="1200" dirty="0" smtClean="0">
+                          <a:solidFill>
+                            <a:schemeClr val="dk1"/>
+                          </a:solidFill>
+                          <a:latin typeface="+mn-lt"/>
+                          <a:ea typeface="+mn-ea"/>
+                          <a:cs typeface="+mn-cs"/>
+                        </a:rPr>
+                        <a:t>MOBILE</a:t>
+                      </a:r>
+                      <a:endParaRPr lang="en-US" sz="1300" dirty="0"/>
+                    </a:p>
+                  </a:txBody>
+                  <a:tcPr/>
+                </a:tc>
+                <a:tc>
+                  <a:txBody>
+                    <a:bodyPr/>
+                    <a:lstStyle/>
+                    <a:p>
+                      <a:endParaRPr lang="en-US" sz="1300" dirty="0"/>
+                    </a:p>
+                  </a:txBody>
+                  <a:tcPr/>
+                </a:tc>
+              </a:tr>
+              <a:tr h="370840">
+                <a:tc>
+                  <a:txBody>
+                    <a:bodyPr/>
+                    <a:lstStyle/>
+                    <a:p>
+                      <a:r>
+                        <a:rPr lang="en-US" sz="1300" kern="1200" dirty="0" smtClean="0">
+                          <a:solidFill>
+                            <a:schemeClr val="dk1"/>
+                          </a:solidFill>
+                          <a:latin typeface="+mn-lt"/>
+                          <a:ea typeface="+mn-ea"/>
+                          <a:cs typeface="+mn-cs"/>
+                        </a:rPr>
+                        <a:t>DEVICE_MODEL</a:t>
+                      </a:r>
+                      <a:endParaRPr lang="en-US" sz="1300" dirty="0"/>
+                    </a:p>
+                  </a:txBody>
+                  <a:tcPr/>
+                </a:tc>
+                <a:tc>
+                  <a:txBody>
+                    <a:bodyPr/>
+                    <a:lstStyle/>
+                    <a:p>
+                      <a:r>
+                        <a:rPr lang="en-US" sz="1300" kern="1200" dirty="0" smtClean="0">
+                          <a:solidFill>
+                            <a:schemeClr val="dk1"/>
+                          </a:solidFill>
+                          <a:latin typeface="+mn-lt"/>
+                          <a:ea typeface="+mn-ea"/>
+                          <a:cs typeface="+mn-cs"/>
+                        </a:rPr>
+                        <a:t>iPhone5,3, iPhone8,1</a:t>
+                      </a:r>
+                      <a:endParaRPr lang="en-US" sz="1300" dirty="0"/>
+                    </a:p>
+                  </a:txBody>
+                  <a:tcPr/>
+                </a:tc>
+                <a:tc>
+                  <a:txBody>
+                    <a:bodyPr/>
+                    <a:lstStyle/>
+                    <a:p>
+                      <a:r>
+                        <a:rPr lang="en-US" sz="1300" kern="1200" dirty="0" smtClean="0">
+                          <a:solidFill>
+                            <a:schemeClr val="dk1"/>
+                          </a:solidFill>
+                          <a:latin typeface="+mn-lt"/>
+                          <a:ea typeface="+mn-ea"/>
+                          <a:cs typeface="+mn-cs"/>
+                        </a:rPr>
+                        <a:t>Unique device model identifier</a:t>
+                      </a:r>
+                      <a:endParaRPr lang="en-US" sz="1300" dirty="0"/>
+                    </a:p>
+                  </a:txBody>
+                  <a:tcPr/>
+                </a:tc>
+              </a:tr>
+              <a:tr h="370840">
+                <a:tc>
+                  <a:txBody>
+                    <a:bodyPr/>
+                    <a:lstStyle/>
+                    <a:p>
+                      <a:r>
+                        <a:rPr lang="en-US" sz="1300" kern="1200" dirty="0" smtClean="0">
+                          <a:solidFill>
+                            <a:schemeClr val="dk1"/>
+                          </a:solidFill>
+                          <a:latin typeface="+mn-lt"/>
+                          <a:ea typeface="+mn-ea"/>
+                          <a:cs typeface="+mn-cs"/>
+                        </a:rPr>
+                        <a:t>DEVICE_OPERATING_SYSTEM</a:t>
+                      </a:r>
+                      <a:endParaRPr lang="en-US" sz="1300" dirty="0"/>
+                    </a:p>
+                  </a:txBody>
+                  <a:tcPr/>
+                </a:tc>
+                <a:tc>
+                  <a:txBody>
+                    <a:bodyPr/>
+                    <a:lstStyle/>
+                    <a:p>
+                      <a:r>
+                        <a:rPr lang="en-US" sz="1300" kern="1200" dirty="0" err="1" smtClean="0">
+                          <a:solidFill>
+                            <a:schemeClr val="dk1"/>
+                          </a:solidFill>
+                          <a:latin typeface="+mn-lt"/>
+                          <a:ea typeface="+mn-ea"/>
+                          <a:cs typeface="+mn-cs"/>
+                        </a:rPr>
+                        <a:t>iOS</a:t>
+                      </a:r>
+                      <a:r>
+                        <a:rPr lang="en-US" sz="1300" kern="1200" dirty="0" smtClean="0">
+                          <a:solidFill>
+                            <a:schemeClr val="dk1"/>
+                          </a:solidFill>
+                          <a:latin typeface="+mn-lt"/>
+                          <a:ea typeface="+mn-ea"/>
+                          <a:cs typeface="+mn-cs"/>
+                        </a:rPr>
+                        <a:t>, android, iPhone OS</a:t>
+                      </a:r>
+                      <a:endParaRPr lang="en-US" sz="1300" dirty="0"/>
+                    </a:p>
+                  </a:txBody>
+                  <a:tcPr/>
+                </a:tc>
+                <a:tc>
+                  <a:txBody>
+                    <a:bodyPr/>
+                    <a:lstStyle/>
+                    <a:p>
+                      <a:r>
+                        <a:rPr lang="en-US" sz="1300" kern="1200" dirty="0" smtClean="0">
+                          <a:solidFill>
+                            <a:schemeClr val="dk1"/>
+                          </a:solidFill>
+                          <a:latin typeface="+mn-lt"/>
+                          <a:ea typeface="+mn-ea"/>
+                          <a:cs typeface="+mn-cs"/>
+                        </a:rPr>
+                        <a:t>Operating system installed on the mobile device</a:t>
+                      </a:r>
+                      <a:endParaRPr lang="en-US" sz="1300" dirty="0"/>
+                    </a:p>
+                  </a:txBody>
+                  <a:tcPr/>
+                </a:tc>
+              </a:tr>
+              <a:tr h="370840">
+                <a:tc>
+                  <a:txBody>
+                    <a:bodyPr/>
+                    <a:lstStyle/>
+                    <a:p>
+                      <a:r>
+                        <a:rPr lang="en-US" sz="1300" kern="1200" dirty="0" smtClean="0">
+                          <a:solidFill>
+                            <a:schemeClr val="dk1"/>
+                          </a:solidFill>
+                          <a:latin typeface="+mn-lt"/>
+                          <a:ea typeface="+mn-ea"/>
+                          <a:cs typeface="+mn-cs"/>
+                        </a:rPr>
+                        <a:t>DEVICE_OPERATING_SYSTEM_VERSION</a:t>
+                      </a:r>
+                      <a:endParaRPr lang="en-US" sz="1300" dirty="0"/>
+                    </a:p>
+                  </a:txBody>
+                  <a:tcPr/>
+                </a:tc>
+                <a:tc>
+                  <a:txBody>
+                    <a:bodyPr/>
+                    <a:lstStyle/>
+                    <a:p>
+                      <a:r>
+                        <a:rPr lang="hr-HR" sz="1300" kern="1200" dirty="0" smtClean="0">
+                          <a:solidFill>
+                            <a:schemeClr val="dk1"/>
+                          </a:solidFill>
+                          <a:latin typeface="+mn-lt"/>
+                          <a:ea typeface="+mn-ea"/>
+                          <a:cs typeface="+mn-cs"/>
+                        </a:rPr>
+                        <a:t>10.2.1, 6.0.1, 9.3</a:t>
+                      </a:r>
+                      <a:endParaRPr lang="en-US" sz="1300" dirty="0"/>
+                    </a:p>
+                  </a:txBody>
+                  <a:tcPr/>
+                </a:tc>
+                <a:tc>
+                  <a:txBody>
+                    <a:bodyPr/>
+                    <a:lstStyle/>
+                    <a:p>
+                      <a:r>
+                        <a:rPr lang="en-US" sz="1300" kern="1200" dirty="0" smtClean="0">
+                          <a:solidFill>
+                            <a:schemeClr val="dk1"/>
+                          </a:solidFill>
+                          <a:latin typeface="+mn-lt"/>
+                          <a:ea typeface="+mn-ea"/>
+                          <a:cs typeface="+mn-cs"/>
+                        </a:rPr>
+                        <a:t>Operating system version installed on the mobile device</a:t>
+                      </a:r>
+                      <a:endParaRPr lang="en-US" sz="1300" dirty="0"/>
+                    </a:p>
+                  </a:txBody>
+                  <a:tcPr/>
+                </a:tc>
+              </a:tr>
+              <a:tr h="370840">
+                <a:tc>
+                  <a:txBody>
+                    <a:bodyPr/>
+                    <a:lstStyle/>
+                    <a:p>
+                      <a:r>
+                        <a:rPr lang="en-US" sz="1300" kern="1200" dirty="0" smtClean="0">
+                          <a:solidFill>
+                            <a:schemeClr val="dk1"/>
+                          </a:solidFill>
+                          <a:latin typeface="+mn-lt"/>
+                          <a:ea typeface="+mn-ea"/>
+                          <a:cs typeface="+mn-cs"/>
+                        </a:rPr>
+                        <a:t>DEVICE_TYPE</a:t>
+                      </a:r>
+                      <a:endParaRPr lang="en-US" sz="1300" dirty="0"/>
+                    </a:p>
+                  </a:txBody>
+                  <a:tcPr/>
+                </a:tc>
+                <a:tc>
+                  <a:txBody>
+                    <a:bodyPr/>
+                    <a:lstStyle/>
+                    <a:p>
+                      <a:r>
+                        <a:rPr lang="en-US" sz="1300" kern="1200" dirty="0" smtClean="0">
+                          <a:solidFill>
+                            <a:schemeClr val="dk1"/>
+                          </a:solidFill>
+                          <a:latin typeface="+mn-lt"/>
+                          <a:ea typeface="+mn-ea"/>
+                          <a:cs typeface="+mn-cs"/>
+                        </a:rPr>
+                        <a:t>iPhone, Android, </a:t>
+                      </a:r>
+                      <a:r>
+                        <a:rPr lang="en-US" sz="1300" kern="1200" dirty="0" err="1" smtClean="0">
+                          <a:solidFill>
+                            <a:schemeClr val="dk1"/>
+                          </a:solidFill>
+                          <a:latin typeface="+mn-lt"/>
+                          <a:ea typeface="+mn-ea"/>
+                          <a:cs typeface="+mn-cs"/>
+                        </a:rPr>
+                        <a:t>iPad</a:t>
+                      </a:r>
+                      <a:endParaRPr lang="en-US" sz="1300" dirty="0"/>
+                    </a:p>
+                  </a:txBody>
+                  <a:tcPr/>
+                </a:tc>
+                <a:tc>
+                  <a:txBody>
+                    <a:bodyPr/>
+                    <a:lstStyle/>
+                    <a:p>
+                      <a:r>
+                        <a:rPr lang="en-US" sz="1300" kern="1200" dirty="0" smtClean="0">
+                          <a:solidFill>
+                            <a:schemeClr val="dk1"/>
+                          </a:solidFill>
+                          <a:latin typeface="+mn-lt"/>
+                          <a:ea typeface="+mn-ea"/>
+                          <a:cs typeface="+mn-cs"/>
+                        </a:rPr>
+                        <a:t>General device type identifier</a:t>
+                      </a:r>
+                      <a:endParaRPr lang="en-US" sz="1300" dirty="0"/>
+                    </a:p>
+                  </a:txBody>
+                  <a:tcPr/>
+                </a:tc>
+              </a:tr>
+              <a:tr h="370840">
+                <a:tc>
+                  <a:txBody>
+                    <a:bodyPr/>
+                    <a:lstStyle/>
+                    <a:p>
+                      <a:r>
+                        <a:rPr lang="en-US" sz="1300" kern="1200" dirty="0" smtClean="0">
+                          <a:solidFill>
+                            <a:schemeClr val="dk1"/>
+                          </a:solidFill>
+                          <a:latin typeface="+mn-lt"/>
+                          <a:ea typeface="+mn-ea"/>
+                          <a:cs typeface="+mn-cs"/>
+                        </a:rPr>
+                        <a:t>RESULT_DISPOSITION</a:t>
+                      </a:r>
+                      <a:endParaRPr lang="en-US" sz="1300" dirty="0"/>
+                    </a:p>
+                  </a:txBody>
+                  <a:tcPr/>
+                </a:tc>
+                <a:tc>
+                  <a:txBody>
+                    <a:bodyPr/>
+                    <a:lstStyle/>
+                    <a:p>
+                      <a:r>
+                        <a:rPr lang="en-US" sz="1300" kern="1200" dirty="0" smtClean="0">
+                          <a:solidFill>
+                            <a:schemeClr val="dk1"/>
+                          </a:solidFill>
+                          <a:latin typeface="+mn-lt"/>
+                          <a:ea typeface="+mn-ea"/>
+                          <a:cs typeface="+mn-cs"/>
+                        </a:rPr>
+                        <a:t>Success, Policy, Failure</a:t>
+                      </a:r>
+                      <a:endParaRPr lang="en-US" sz="1300" dirty="0"/>
+                    </a:p>
+                  </a:txBody>
+                  <a:tcPr/>
+                </a:tc>
+                <a:tc>
+                  <a:txBody>
+                    <a:bodyPr/>
+                    <a:lstStyle/>
+                    <a:p>
+                      <a:r>
+                        <a:rPr lang="en-US" sz="1300" kern="1200" dirty="0" smtClean="0">
+                          <a:solidFill>
+                            <a:schemeClr val="dk1"/>
+                          </a:solidFill>
+                          <a:latin typeface="+mn-lt"/>
+                          <a:ea typeface="+mn-ea"/>
+                          <a:cs typeface="+mn-cs"/>
+                        </a:rPr>
+                        <a:t>Result experienced by the user when attempting to login</a:t>
+                      </a:r>
+                      <a:endParaRPr lang="en-US" sz="1300" dirty="0"/>
+                    </a:p>
+                  </a:txBody>
+                  <a:tcPr/>
+                </a:tc>
+              </a:tr>
+              <a:tr h="370840">
+                <a:tc>
+                  <a:txBody>
+                    <a:bodyPr/>
+                    <a:lstStyle/>
+                    <a:p>
+                      <a:endParaRPr lang="en-US" sz="1300"/>
+                    </a:p>
+                  </a:txBody>
+                  <a:tcPr/>
+                </a:tc>
+                <a:tc>
+                  <a:txBody>
+                    <a:bodyPr/>
+                    <a:lstStyle/>
+                    <a:p>
+                      <a:endParaRPr lang="en-US" sz="1300" dirty="0"/>
+                    </a:p>
+                  </a:txBody>
+                  <a:tcPr/>
+                </a:tc>
+                <a:tc>
+                  <a:txBody>
+                    <a:bodyPr/>
+                    <a:lstStyle/>
+                    <a:p>
+                      <a:endParaRPr lang="en-US" sz="1300" dirty="0"/>
+                    </a:p>
+                  </a:txBody>
+                  <a:tcPr/>
+                </a:tc>
+              </a:tr>
+              <a:tr h="370840">
+                <a:tc>
+                  <a:txBody>
+                    <a:bodyPr/>
+                    <a:lstStyle/>
+                    <a:p>
+                      <a:endParaRPr lang="en-US" sz="1300"/>
+                    </a:p>
+                  </a:txBody>
+                  <a:tcPr/>
+                </a:tc>
+                <a:tc>
+                  <a:txBody>
+                    <a:bodyPr/>
+                    <a:lstStyle/>
+                    <a:p>
+                      <a:endParaRPr lang="en-US" sz="1300"/>
+                    </a:p>
+                  </a:txBody>
+                  <a:tcPr/>
+                </a:tc>
+                <a:tc>
+                  <a:txBody>
+                    <a:bodyPr/>
+                    <a:lstStyle/>
+                    <a:p>
+                      <a:endParaRPr lang="en-US" sz="1300" dirty="0"/>
+                    </a:p>
+                  </a:txBody>
+                  <a:tcPr/>
+                </a:tc>
+              </a:tr>
+            </a:tbl>
+          </a:graphicData>
+        </a:graphic>
+      </p:graphicFrame>
+    </p:spTree>
+    <p:extLst>
+      <p:ext uri="{BB962C8B-B14F-4D97-AF65-F5344CB8AC3E}">
+        <p14:creationId xmlns:p14="http://schemas.microsoft.com/office/powerpoint/2010/main" val="2982437341"/>
       </p:ext>
     </p:extLst>
   </p:cSld>

</xml_diff>

<commit_message>
Added data dictionary & minor edits
</commit_message>
<xml_diff>
--- a/CapstoneProjectProposal.pptx
+++ b/CapstoneProjectProposal.pptx
@@ -297,7 +297,7 @@
           <a:p>
             <a:fld id="{C8A432C8-69A7-458B-9684-2BFA64B31948}" type="datetime2">
               <a:rPr lang="en-US" smtClean="0"/>
-              <a:t>Saturday, February 25, 17</a:t>
+              <a:t>Sunday, February 26, 17</a:t>
             </a:fld>
             <a:endParaRPr lang="en-US"/>
           </a:p>
@@ -499,7 +499,7 @@
           <a:p>
             <a:fld id="{8CC057FC-95B6-4D89-AFDA-ABA33EE921E5}" type="datetime2">
               <a:rPr lang="en-US" smtClean="0"/>
-              <a:t>Saturday, February 25, 17</a:t>
+              <a:t>Sunday, February 26, 17</a:t>
             </a:fld>
             <a:endParaRPr lang="en-US"/>
           </a:p>
@@ -676,7 +676,7 @@
           <a:p>
             <a:fld id="{EC4549AC-EB31-477F-92A9-B1988E232878}" type="datetime2">
               <a:rPr lang="en-US" smtClean="0"/>
-              <a:t>Saturday, February 25, 17</a:t>
+              <a:t>Sunday, February 26, 17</a:t>
             </a:fld>
             <a:endParaRPr lang="en-US"/>
           </a:p>
@@ -843,7 +843,7 @@
           <a:p>
             <a:fld id="{6396A3A3-94A6-4E5B-AF39-173ACA3E61CC}" type="datetime2">
               <a:rPr lang="en-US" smtClean="0"/>
-              <a:t>Saturday, February 25, 17</a:t>
+              <a:t>Sunday, February 26, 17</a:t>
             </a:fld>
             <a:endParaRPr lang="en-US"/>
           </a:p>
@@ -1093,7 +1093,7 @@
           <a:p>
             <a:fld id="{9933D019-A32C-4EAD-B8E6-DBDA699692FD}" type="datetime2">
               <a:rPr lang="en-US" smtClean="0"/>
-              <a:t>Saturday, February 25, 17</a:t>
+              <a:t>Sunday, February 26, 17</a:t>
             </a:fld>
             <a:endParaRPr lang="en-US"/>
           </a:p>
@@ -1413,7 +1413,7 @@
           <a:p>
             <a:fld id="{CCEBA98F-560C-4997-81C4-81D4D9187EAB}" type="datetime2">
               <a:rPr lang="en-US" smtClean="0"/>
-              <a:t>Saturday, February 25, 17</a:t>
+              <a:t>Sunday, February 26, 17</a:t>
             </a:fld>
             <a:endParaRPr lang="en-US"/>
           </a:p>
@@ -1881,7 +1881,7 @@
           <a:p>
             <a:fld id="{150972B2-CA5C-437D-87D0-8081271A9E4B}" type="datetime2">
               <a:rPr lang="en-US" smtClean="0"/>
-              <a:t>Saturday, February 25, 17</a:t>
+              <a:t>Sunday, February 26, 17</a:t>
             </a:fld>
             <a:endParaRPr lang="en-US"/>
           </a:p>
@@ -2031,7 +2031,7 @@
           <a:p>
             <a:fld id="{79CD4847-11EF-4466-A8AD-85CDB7B49118}" type="datetime2">
               <a:rPr lang="en-US" smtClean="0"/>
-              <a:t>Saturday, February 25, 17</a:t>
+              <a:t>Sunday, February 26, 17</a:t>
             </a:fld>
             <a:endParaRPr lang="en-US"/>
           </a:p>
@@ -2123,7 +2123,7 @@
           <a:p>
             <a:fld id="{F168457A-3AB9-4880-8A0C-9F8524491207}" type="datetime2">
               <a:rPr lang="en-US" smtClean="0"/>
-              <a:t>Saturday, February 25, 17</a:t>
+              <a:t>Sunday, February 26, 17</a:t>
             </a:fld>
             <a:endParaRPr lang="en-US"/>
           </a:p>
@@ -2399,7 +2399,7 @@
           <a:p>
             <a:fld id="{3FE976D3-5B7F-4300-ABED-C91F1B2AE209}" type="datetime2">
               <a:rPr lang="en-US" smtClean="0"/>
-              <a:t>Saturday, February 25, 17</a:t>
+              <a:t>Sunday, February 26, 17</a:t>
             </a:fld>
             <a:endParaRPr lang="en-US"/>
           </a:p>
@@ -2706,7 +2706,7 @@
           <a:p>
             <a:fld id="{EBDC1E59-17DD-41CE-97CA-624A472382D4}" type="datetime2">
               <a:rPr lang="en-US" smtClean="0"/>
-              <a:t>Saturday, February 25, 17</a:t>
+              <a:t>Sunday, February 26, 17</a:t>
             </a:fld>
             <a:endParaRPr lang="en-US"/>
           </a:p>
@@ -3006,7 +3006,7 @@
           <a:p>
             <a:fld id="{A80CB818-7379-467D-8E76-EF9D9074A26C}" type="datetime2">
               <a:rPr lang="en-US" smtClean="0"/>
-              <a:t>Saturday, February 25, 17</a:t>
+              <a:t>Sunday, February 26, 17</a:t>
             </a:fld>
             <a:endParaRPr lang="en-US" dirty="0"/>
           </a:p>
@@ -3548,7 +3548,11 @@
           <a:p>
             <a:r>
               <a:rPr lang="en-US" dirty="0" smtClean="0"/>
-              <a:t>Project Proposal</a:t>
+              <a:t>Project </a:t>
+            </a:r>
+            <a:r>
+              <a:rPr lang="en-US" dirty="0" smtClean="0"/>
+              <a:t>Proposal Summary</a:t>
             </a:r>
             <a:endParaRPr lang="en-US" dirty="0"/>
           </a:p>
@@ -3566,7 +3570,9 @@
         </p:nvSpPr>
         <p:spPr/>
         <p:txBody>
-          <a:bodyPr/>
+          <a:bodyPr>
+            <a:normAutofit/>
+          </a:bodyPr>
           <a:lstStyle/>
           <a:p>
             <a:pPr marL="0" indent="0">
@@ -3614,13 +3620,8 @@
             </a:r>
             <a:r>
               <a:rPr lang="en-US" sz="1400" dirty="0" smtClean="0"/>
-              <a:t>Improve visibility of login patterns and issues to refine adoption projections and </a:t>
-            </a:r>
-            <a:r>
-              <a:rPr lang="en-US" sz="1400" dirty="0" smtClean="0"/>
-              <a:t>drive prioritization of enhancements and fixes.</a:t>
-            </a:r>
-            <a:endParaRPr lang="en-US" sz="1400" dirty="0" smtClean="0"/>
+              <a:t>Improve visibility of login patterns and issues to refine adoption projections and drive prioritization of enhancements and fixes.</a:t>
+            </a:r>
           </a:p>
           <a:p>
             <a:pPr marL="731520" lvl="1" indent="-457200">
@@ -3682,15 +3683,31 @@
             </a:pPr>
             <a:r>
               <a:rPr lang="en-US" sz="1400" dirty="0" smtClean="0"/>
-              <a:t>Data will be extracted from the source, cleaned and </a:t>
+              <a:t>Login data will </a:t>
             </a:r>
             <a:r>
               <a:rPr lang="en-US" sz="1400" dirty="0" smtClean="0"/>
-              <a:t>transformed, </a:t>
+              <a:t>be extracted from </a:t>
             </a:r>
             <a:r>
               <a:rPr lang="en-US" sz="1400" dirty="0" smtClean="0"/>
-              <a:t>analyzed and summarized.</a:t>
+              <a:t>API and </a:t>
+            </a:r>
+            <a:r>
+              <a:rPr lang="en-US" sz="1400" dirty="0" smtClean="0"/>
+              <a:t>user activity logs. Initial extraction and lite wrangling will occur in </a:t>
+            </a:r>
+            <a:r>
+              <a:rPr lang="en-US" sz="1400" dirty="0" err="1" smtClean="0"/>
+              <a:t>Splunk</a:t>
+            </a:r>
+            <a:r>
+              <a:rPr lang="en-US" sz="1400" dirty="0" smtClean="0"/>
+              <a:t>. Final wrangling</a:t>
+            </a:r>
+            <a:r>
+              <a:rPr lang="en-US" sz="1400" dirty="0" smtClean="0"/>
+              <a:t>, analysis, summarization and visualization will be completed in R.</a:t>
             </a:r>
             <a:endParaRPr lang="en-US" sz="1400" dirty="0"/>
           </a:p>
@@ -3709,15 +3726,7 @@
             </a:pPr>
             <a:r>
               <a:rPr lang="en-US" sz="1400" dirty="0" smtClean="0"/>
-              <a:t>README, Slide </a:t>
-            </a:r>
-            <a:r>
-              <a:rPr lang="en-US" sz="1400" dirty="0" smtClean="0"/>
-              <a:t>Deck, R Code</a:t>
-            </a:r>
-            <a:r>
-              <a:rPr lang="en-US" sz="1400" dirty="0" smtClean="0"/>
-              <a:t>, and Report</a:t>
+              <a:t>README, Slide Deck, R Code, and Report</a:t>
             </a:r>
             <a:endParaRPr lang="en-US" sz="1400" dirty="0"/>
           </a:p>

</xml_diff>